<commit_message>
Update to separate negishi and equity scenarios
</commit_message>
<xml_diff>
--- a/2024_Jul16_AdvisingCheck-in.pptx
+++ b/2024_Jul16_AdvisingCheck-in.pptx
@@ -9854,13 +9854,8 @@
           <a:p>
             <a:r>
               <a:rPr lang="en-US" dirty="0"/>
-              <a:t>Methodology Summary: Implementing L&amp;</a:t>
-            </a:r>
-            <a:r>
-              <a:rPr lang="en-US"/>
-              <a:t>D transfers</a:t>
-            </a:r>
-            <a:endParaRPr lang="en-US" dirty="0"/>
+              <a:t>Methodology Summary: Implementing L&amp;D transfers</a:t>
+            </a:r>
           </a:p>
         </p:txBody>
       </p:sp>

</xml_diff>